<commit_message>
added presentations and updated timelog
</commit_message>
<xml_diff>
--- a/meetings/week 10/week10_presentation.pptx
+++ b/meetings/week 10/week10_presentation.pptx
@@ -112,6 +112,11 @@
       </a:defRPr>
     </a:lvl9pPr>
   </p:defaultTextStyle>
+  <p:extLst>
+    <p:ext uri="{EFAFB233-063F-42B5-8137-9DF3F51BA10A}">
+      <p15:sldGuideLst xmlns:p15="http://schemas.microsoft.com/office/powerpoint/2012/main"/>
+    </p:ext>
+  </p:extLst>
 </p:presentation>
 </file>
 
@@ -269,7 +274,7 @@
           <a:p>
             <a:fld id="{11EAACC7-3B3F-47D1-959A-EF58926E955E}" type="datetimeFigureOut">
               <a:rPr lang="en-US" smtClean="0"/>
-              <a:t>11/21/22</a:t>
+              <a:t>11/22/22</a:t>
             </a:fld>
             <a:endParaRPr lang="en-US"/>
           </a:p>
@@ -467,7 +472,7 @@
           <a:p>
             <a:fld id="{11EAACC7-3B3F-47D1-959A-EF58926E955E}" type="datetimeFigureOut">
               <a:rPr lang="en-US" smtClean="0"/>
-              <a:t>11/21/22</a:t>
+              <a:t>11/22/22</a:t>
             </a:fld>
             <a:endParaRPr lang="en-US"/>
           </a:p>
@@ -675,7 +680,7 @@
           <a:p>
             <a:fld id="{11EAACC7-3B3F-47D1-959A-EF58926E955E}" type="datetimeFigureOut">
               <a:rPr lang="en-US" smtClean="0"/>
-              <a:t>11/21/22</a:t>
+              <a:t>11/22/22</a:t>
             </a:fld>
             <a:endParaRPr lang="en-US"/>
           </a:p>
@@ -904,7 +909,7 @@
           <a:p>
             <a:fld id="{11EAACC7-3B3F-47D1-959A-EF58926E955E}" type="datetimeFigureOut">
               <a:rPr lang="en-US" smtClean="0"/>
-              <a:t>11/21/22</a:t>
+              <a:t>11/22/22</a:t>
             </a:fld>
             <a:endParaRPr lang="en-US" dirty="0"/>
           </a:p>
@@ -1179,7 +1184,7 @@
           <a:p>
             <a:fld id="{11EAACC7-3B3F-47D1-959A-EF58926E955E}" type="datetimeFigureOut">
               <a:rPr lang="en-US" smtClean="0"/>
-              <a:t>11/21/22</a:t>
+              <a:t>11/22/22</a:t>
             </a:fld>
             <a:endParaRPr lang="en-US"/>
           </a:p>
@@ -1445,7 +1450,7 @@
           <a:p>
             <a:fld id="{11EAACC7-3B3F-47D1-959A-EF58926E955E}" type="datetimeFigureOut">
               <a:rPr lang="en-US" smtClean="0"/>
-              <a:t>11/21/22</a:t>
+              <a:t>11/22/22</a:t>
             </a:fld>
             <a:endParaRPr lang="en-US"/>
           </a:p>
@@ -1862,7 +1867,7 @@
           <a:p>
             <a:fld id="{11EAACC7-3B3F-47D1-959A-EF58926E955E}" type="datetimeFigureOut">
               <a:rPr lang="en-US" smtClean="0"/>
-              <a:t>11/21/22</a:t>
+              <a:t>11/22/22</a:t>
             </a:fld>
             <a:endParaRPr lang="en-US"/>
           </a:p>
@@ -2003,7 +2008,7 @@
           <a:p>
             <a:fld id="{11EAACC7-3B3F-47D1-959A-EF58926E955E}" type="datetimeFigureOut">
               <a:rPr lang="en-US" smtClean="0"/>
-              <a:t>11/21/22</a:t>
+              <a:t>11/22/22</a:t>
             </a:fld>
             <a:endParaRPr lang="en-US"/>
           </a:p>
@@ -2116,7 +2121,7 @@
           <a:p>
             <a:fld id="{11EAACC7-3B3F-47D1-959A-EF58926E955E}" type="datetimeFigureOut">
               <a:rPr lang="en-US" smtClean="0"/>
-              <a:t>11/21/22</a:t>
+              <a:t>11/22/22</a:t>
             </a:fld>
             <a:endParaRPr lang="en-US"/>
           </a:p>
@@ -2427,7 +2432,7 @@
           <a:p>
             <a:fld id="{11EAACC7-3B3F-47D1-959A-EF58926E955E}" type="datetimeFigureOut">
               <a:rPr lang="en-US" smtClean="0"/>
-              <a:t>11/21/22</a:t>
+              <a:t>11/22/22</a:t>
             </a:fld>
             <a:endParaRPr lang="en-US"/>
           </a:p>
@@ -2718,7 +2723,7 @@
           <a:p>
             <a:fld id="{11EAACC7-3B3F-47D1-959A-EF58926E955E}" type="datetimeFigureOut">
               <a:rPr lang="en-US" smtClean="0"/>
-              <a:t>11/21/22</a:t>
+              <a:t>11/22/22</a:t>
             </a:fld>
             <a:endParaRPr lang="en-US"/>
           </a:p>
@@ -3275,7 +3280,7 @@
           <a:p>
             <a:fld id="{11EAACC7-3B3F-47D1-959A-EF58926E955E}" type="datetimeFigureOut">
               <a:rPr lang="en-US" smtClean="0"/>
-              <a:t>11/21/22</a:t>
+              <a:t>11/22/22</a:t>
             </a:fld>
             <a:endParaRPr lang="en-US"/>
           </a:p>
@@ -4298,7 +4303,7 @@
         <p:spPr/>
         <p:txBody>
           <a:bodyPr>
-            <a:normAutofit fontScale="77500" lnSpcReduction="20000"/>
+            <a:normAutofit fontScale="70000" lnSpcReduction="20000"/>
           </a:bodyPr>
           <a:lstStyle/>
           <a:p>
@@ -4376,6 +4381,12 @@
             <a:r>
               <a:rPr lang="en-US" dirty="0"/>
               <a:t>Started work on Robot demo, (This has been put on hold for now).</a:t>
+            </a:r>
+          </a:p>
+          <a:p>
+            <a:r>
+              <a:rPr lang="en-US" dirty="0"/>
+              <a:t>Produced Piano Peer demo.</a:t>
             </a:r>
           </a:p>
           <a:p>
@@ -4511,6 +4522,12 @@
             <a:r>
               <a:rPr lang="en-US" dirty="0"/>
               <a:t>This may need further inspection for details like dropped frames.</a:t>
+            </a:r>
+          </a:p>
+          <a:p>
+            <a:r>
+              <a:rPr lang="en-US" dirty="0"/>
+              <a:t>Added Video Stats to peer package.</a:t>
             </a:r>
           </a:p>
         </p:txBody>
@@ -5048,12 +5065,8 @@
           <a:lstStyle/>
           <a:p>
             <a:r>
-              <a:rPr lang="en-US" dirty="0" err="1"/>
-              <a:t>Whats</a:t>
-            </a:r>
-            <a:r>
-              <a:rPr lang="en-US" dirty="0"/>
-              <a:t> Next? </a:t>
+              <a:rPr lang="en-US" dirty="0"/>
+              <a:t>What's Next? </a:t>
             </a:r>
             <a:br>
               <a:rPr lang="en-US" dirty="0"/>
@@ -5107,20 +5120,7 @@
           <a:p>
             <a:r>
               <a:rPr lang="en-US" dirty="0"/>
-              <a:t>Add Video Stats to peer package.</a:t>
-            </a:r>
-          </a:p>
-          <a:p>
-            <a:r>
-              <a:rPr lang="en-US" dirty="0"/>
               <a:t>Demos</a:t>
-            </a:r>
-            <a:br>
-              <a:rPr lang="en-US" dirty="0"/>
-            </a:br>
-            <a:r>
-              <a:rPr lang="en-US" dirty="0"/>
-              <a:t>	Piano Phone Demo</a:t>
             </a:r>
             <a:br>
               <a:rPr lang="en-US" dirty="0"/>

</xml_diff>